<commit_message>
Update BasicProgramming and Intro to R (KCL).pptx
</commit_message>
<xml_diff>
--- a/BasicProgramming and Intro to R (KCL).pptx
+++ b/BasicProgramming and Intro to R (KCL).pptx
@@ -9013,8 +9013,8 @@
         </p:nvSpPr>
         <p:spPr>
           <a:xfrm>
-            <a:off x="652771" y="2727701"/>
-            <a:ext cx="7968963" cy="870264"/>
+            <a:off x="261133" y="2727701"/>
+            <a:ext cx="8621734" cy="870264"/>
           </a:xfrm>
         </p:spPr>
         <p:txBody>
@@ -9024,7 +9024,14 @@
             <a:pPr algn="ctr"/>
             <a:r>
               <a:rPr lang="en-GB" dirty="0"/>
-              <a:t>Basic Programming</a:t>
+              <a:t>Introduction to</a:t>
+            </a:r>
+            <a:br>
+              <a:rPr lang="en-GB" dirty="0"/>
+            </a:br>
+            <a:r>
+              <a:rPr lang="en-GB" dirty="0"/>
+              <a:t>Programming and Coding</a:t>
             </a:r>
           </a:p>
         </p:txBody>
@@ -9047,7 +9054,7 @@
         </p:nvSpPr>
         <p:spPr>
           <a:xfrm>
-            <a:off x="652771" y="3597965"/>
+            <a:off x="587518" y="4049228"/>
             <a:ext cx="7968963" cy="1337780"/>
           </a:xfrm>
         </p:spPr>

</xml_diff>